<commit_message>
In case I may need a presentation.
</commit_message>
<xml_diff>
--- a/TDI_CapStone_Suat_Akbulut.pptx
+++ b/TDI_CapStone_Suat_Akbulut.pptx
@@ -6768,7 +6768,12 @@
             <p:ph idx="1"/>
           </p:nvPr>
         </p:nvSpPr>
-        <p:spPr/>
+        <p:spPr>
+          <a:xfrm>
+            <a:off x="3821142" y="1496730"/>
+            <a:ext cx="7315200" cy="3077919"/>
+          </a:xfrm>
+        </p:spPr>
         <p:txBody>
           <a:bodyPr>
             <a:normAutofit/>
@@ -6782,36 +6787,6 @@
             </a:r>
           </a:p>
           <a:p>
-            <a:pPr lvl="1"/>
-            <a:r>
-              <a:rPr lang="en-US" dirty="0"/>
-              <a:t>Regressed </a:t>
-            </a:r>
-            <a:r>
-              <a:rPr lang="en-US" dirty="0" err="1"/>
-              <a:t>IsProfit</a:t>
-            </a:r>
-            <a:r>
-              <a:rPr lang="en-US" dirty="0"/>
-              <a:t> on Last 4 days’ candles and volumes: Accuracy:  Precision:  Recall:</a:t>
-            </a:r>
-          </a:p>
-          <a:p>
-            <a:pPr lvl="1"/>
-            <a:r>
-              <a:rPr lang="en-US" dirty="0"/>
-              <a:t>Regressed </a:t>
-            </a:r>
-            <a:r>
-              <a:rPr lang="en-US" dirty="0" err="1"/>
-              <a:t>IsProfit</a:t>
-            </a:r>
-            <a:r>
-              <a:rPr lang="en-US" dirty="0"/>
-              <a:t> on Last 4 days’ candles and volumes: Accuracy:  Precision:  Recall:</a:t>
-            </a:r>
-          </a:p>
-          <a:p>
             <a:endParaRPr lang="en-US" dirty="0"/>
           </a:p>
           <a:p>
@@ -6819,6 +6794,466 @@
           </a:p>
         </p:txBody>
       </p:sp>
+      <p:graphicFrame>
+        <p:nvGraphicFramePr>
+          <p:cNvPr id="4" name="Table 3">
+            <a:extLst>
+              <a:ext uri="{FF2B5EF4-FFF2-40B4-BE49-F238E27FC236}">
+                <a16:creationId xmlns:a16="http://schemas.microsoft.com/office/drawing/2014/main" id="{D99EBE50-08BE-4922-AA63-820883716B73}"/>
+              </a:ext>
+            </a:extLst>
+          </p:cNvPr>
+          <p:cNvGraphicFramePr>
+            <a:graphicFrameLocks noGrp="1"/>
+          </p:cNvGraphicFramePr>
+          <p:nvPr>
+            <p:extLst>
+              <p:ext uri="{D42A27DB-BD31-4B8C-83A1-F6EECF244321}">
+                <p14:modId xmlns:p14="http://schemas.microsoft.com/office/powerpoint/2010/main" val="871748232"/>
+              </p:ext>
+            </p:extLst>
+          </p:nvPr>
+        </p:nvGraphicFramePr>
+        <p:xfrm>
+          <a:off x="5014762" y="3234088"/>
+          <a:ext cx="5380523" cy="2127182"/>
+        </p:xfrm>
+        <a:graphic>
+          <a:graphicData uri="http://schemas.openxmlformats.org/drawingml/2006/table">
+            <a:tbl>
+              <a:tblPr>
+                <a:tableStyleId>{5C22544A-7EE6-4342-B048-85BDC9FD1C3A}</a:tableStyleId>
+              </a:tblPr>
+              <a:tblGrid>
+                <a:gridCol w="2024928">
+                  <a:extLst>
+                    <a:ext uri="{9D8B030D-6E8A-4147-A177-3AD203B41FA5}">
+                      <a16:colId xmlns:a16="http://schemas.microsoft.com/office/drawing/2014/main" val="807458843"/>
+                    </a:ext>
+                  </a:extLst>
+                </a:gridCol>
+                <a:gridCol w="1195672">
+                  <a:extLst>
+                    <a:ext uri="{9D8B030D-6E8A-4147-A177-3AD203B41FA5}">
+                      <a16:colId xmlns:a16="http://schemas.microsoft.com/office/drawing/2014/main" val="3829249315"/>
+                    </a:ext>
+                  </a:extLst>
+                </a:gridCol>
+                <a:gridCol w="1234242">
+                  <a:extLst>
+                    <a:ext uri="{9D8B030D-6E8A-4147-A177-3AD203B41FA5}">
+                      <a16:colId xmlns:a16="http://schemas.microsoft.com/office/drawing/2014/main" val="1736227347"/>
+                    </a:ext>
+                  </a:extLst>
+                </a:gridCol>
+                <a:gridCol w="925681">
+                  <a:extLst>
+                    <a:ext uri="{9D8B030D-6E8A-4147-A177-3AD203B41FA5}">
+                      <a16:colId xmlns:a16="http://schemas.microsoft.com/office/drawing/2014/main" val="559903103"/>
+                    </a:ext>
+                  </a:extLst>
+                </a:gridCol>
+              </a:tblGrid>
+              <a:tr h="405951">
+                <a:tc>
+                  <a:txBody>
+                    <a:bodyPr/>
+                    <a:lstStyle/>
+                    <a:p>
+                      <a:pPr algn="ctr" rtl="0" fontAlgn="ctr"/>
+                      <a:r>
+                        <a:rPr lang="en-US" sz="1100" u="sng" strike="noStrike">
+                          <a:effectLst/>
+                        </a:rPr>
+                        <a:t> Model</a:t>
+                      </a:r>
+                      <a:endParaRPr lang="en-US" sz="1100" b="0" i="0" u="sng" strike="noStrike">
+                        <a:solidFill>
+                          <a:srgbClr val="000000"/>
+                        </a:solidFill>
+                        <a:effectLst/>
+                        <a:latin typeface="Calibri" panose="020F0502020204030204" pitchFamily="34" charset="0"/>
+                      </a:endParaRPr>
+                    </a:p>
+                  </a:txBody>
+                  <a:tcPr marL="9525" marR="9525" marT="9525" marB="0" anchor="ctr"/>
+                </a:tc>
+                <a:tc>
+                  <a:txBody>
+                    <a:bodyPr/>
+                    <a:lstStyle/>
+                    <a:p>
+                      <a:pPr algn="ctr" rtl="0" fontAlgn="ctr"/>
+                      <a:r>
+                        <a:rPr lang="en-US" sz="1400" u="sng" strike="noStrike">
+                          <a:effectLst/>
+                        </a:rPr>
+                        <a:t>Accuracy</a:t>
+                      </a:r>
+                      <a:endParaRPr lang="en-US" sz="1400" b="1" i="0" u="sng" strike="noStrike">
+                        <a:solidFill>
+                          <a:srgbClr val="000000"/>
+                        </a:solidFill>
+                        <a:effectLst/>
+                        <a:latin typeface="Calibri" panose="020F0502020204030204" pitchFamily="34" charset="0"/>
+                      </a:endParaRPr>
+                    </a:p>
+                  </a:txBody>
+                  <a:tcPr marL="9525" marR="9525" marT="9525" marB="0" anchor="ctr"/>
+                </a:tc>
+                <a:tc>
+                  <a:txBody>
+                    <a:bodyPr/>
+                    <a:lstStyle/>
+                    <a:p>
+                      <a:pPr algn="ctr" rtl="0" fontAlgn="ctr"/>
+                      <a:r>
+                        <a:rPr lang="en-US" sz="1400" u="sng" strike="noStrike">
+                          <a:effectLst/>
+                        </a:rPr>
+                        <a:t>Presicion</a:t>
+                      </a:r>
+                      <a:endParaRPr lang="en-US" sz="1400" b="1" i="0" u="sng" strike="noStrike">
+                        <a:solidFill>
+                          <a:srgbClr val="000000"/>
+                        </a:solidFill>
+                        <a:effectLst/>
+                        <a:latin typeface="Calibri" panose="020F0502020204030204" pitchFamily="34" charset="0"/>
+                      </a:endParaRPr>
+                    </a:p>
+                  </a:txBody>
+                  <a:tcPr marL="9525" marR="9525" marT="9525" marB="0" anchor="ctr"/>
+                </a:tc>
+                <a:tc>
+                  <a:txBody>
+                    <a:bodyPr/>
+                    <a:lstStyle/>
+                    <a:p>
+                      <a:pPr algn="ctr" rtl="0" fontAlgn="ctr"/>
+                      <a:r>
+                        <a:rPr lang="en-US" sz="1400" u="sng" strike="noStrike">
+                          <a:effectLst/>
+                        </a:rPr>
+                        <a:t>Recall</a:t>
+                      </a:r>
+                      <a:endParaRPr lang="en-US" sz="1400" b="1" i="0" u="sng" strike="noStrike">
+                        <a:solidFill>
+                          <a:srgbClr val="000000"/>
+                        </a:solidFill>
+                        <a:effectLst/>
+                        <a:latin typeface="Calibri" panose="020F0502020204030204" pitchFamily="34" charset="0"/>
+                      </a:endParaRPr>
+                    </a:p>
+                  </a:txBody>
+                  <a:tcPr marL="9525" marR="9525" marT="9525" marB="0" anchor="ctr"/>
+                </a:tc>
+                <a:extLst>
+                  <a:ext uri="{0D108BD9-81ED-4DB2-BD59-A6C34878D82A}">
+                    <a16:rowId xmlns:a16="http://schemas.microsoft.com/office/drawing/2014/main" val="2988217438"/>
+                  </a:ext>
+                </a:extLst>
+              </a:tr>
+              <a:tr h="454665">
+                <a:tc>
+                  <a:txBody>
+                    <a:bodyPr/>
+                    <a:lstStyle/>
+                    <a:p>
+                      <a:pPr algn="ctr" rtl="0" fontAlgn="ctr"/>
+                      <a:r>
+                        <a:rPr lang="en-US" sz="1400" u="none" strike="noStrike">
+                          <a:effectLst/>
+                        </a:rPr>
+                        <a:t>Logit (Non-Opt)</a:t>
+                      </a:r>
+                      <a:endParaRPr lang="en-US" sz="1400" b="1" i="0" u="none" strike="noStrike">
+                        <a:solidFill>
+                          <a:srgbClr val="000000"/>
+                        </a:solidFill>
+                        <a:effectLst/>
+                        <a:latin typeface="Calibri" panose="020F0502020204030204" pitchFamily="34" charset="0"/>
+                      </a:endParaRPr>
+                    </a:p>
+                  </a:txBody>
+                  <a:tcPr marL="9525" marR="9525" marT="9525" marB="0" anchor="ctr"/>
+                </a:tc>
+                <a:tc>
+                  <a:txBody>
+                    <a:bodyPr/>
+                    <a:lstStyle/>
+                    <a:p>
+                      <a:pPr algn="ctr" rtl="0" fontAlgn="ctr"/>
+                      <a:r>
+                        <a:rPr lang="en-US" sz="1600" u="none" strike="noStrike">
+                          <a:effectLst/>
+                        </a:rPr>
+                        <a:t>0.521</a:t>
+                      </a:r>
+                      <a:endParaRPr lang="en-US" sz="1600" b="0" i="0" u="none" strike="noStrike">
+                        <a:solidFill>
+                          <a:srgbClr val="000000"/>
+                        </a:solidFill>
+                        <a:effectLst/>
+                        <a:latin typeface="Calibri" panose="020F0502020204030204" pitchFamily="34" charset="0"/>
+                      </a:endParaRPr>
+                    </a:p>
+                  </a:txBody>
+                  <a:tcPr marL="9525" marR="9525" marT="9525" marB="0" anchor="ctr"/>
+                </a:tc>
+                <a:tc>
+                  <a:txBody>
+                    <a:bodyPr/>
+                    <a:lstStyle/>
+                    <a:p>
+                      <a:pPr algn="ctr" rtl="0" fontAlgn="ctr"/>
+                      <a:r>
+                        <a:rPr lang="en-US" sz="1600" u="none" strike="noStrike">
+                          <a:effectLst/>
+                        </a:rPr>
+                        <a:t>0.528</a:t>
+                      </a:r>
+                      <a:endParaRPr lang="en-US" sz="1600" b="0" i="0" u="none" strike="noStrike">
+                        <a:solidFill>
+                          <a:srgbClr val="000000"/>
+                        </a:solidFill>
+                        <a:effectLst/>
+                        <a:latin typeface="Calibri" panose="020F0502020204030204" pitchFamily="34" charset="0"/>
+                      </a:endParaRPr>
+                    </a:p>
+                  </a:txBody>
+                  <a:tcPr marL="9525" marR="9525" marT="9525" marB="0" anchor="ctr"/>
+                </a:tc>
+                <a:tc>
+                  <a:txBody>
+                    <a:bodyPr/>
+                    <a:lstStyle/>
+                    <a:p>
+                      <a:pPr algn="ctr" rtl="0" fontAlgn="ctr"/>
+                      <a:r>
+                        <a:rPr lang="en-US" sz="1600" u="none" strike="noStrike">
+                          <a:effectLst/>
+                        </a:rPr>
+                        <a:t>0.756</a:t>
+                      </a:r>
+                      <a:endParaRPr lang="en-US" sz="1600" b="0" i="0" u="none" strike="noStrike">
+                        <a:solidFill>
+                          <a:srgbClr val="000000"/>
+                        </a:solidFill>
+                        <a:effectLst/>
+                        <a:latin typeface="Calibri" panose="020F0502020204030204" pitchFamily="34" charset="0"/>
+                      </a:endParaRPr>
+                    </a:p>
+                  </a:txBody>
+                  <a:tcPr marL="9525" marR="9525" marT="9525" marB="0" anchor="ctr"/>
+                </a:tc>
+                <a:extLst>
+                  <a:ext uri="{0D108BD9-81ED-4DB2-BD59-A6C34878D82A}">
+                    <a16:rowId xmlns:a16="http://schemas.microsoft.com/office/drawing/2014/main" val="3411247393"/>
+                  </a:ext>
+                </a:extLst>
+              </a:tr>
+              <a:tr h="811901">
+                <a:tc>
+                  <a:txBody>
+                    <a:bodyPr/>
+                    <a:lstStyle/>
+                    <a:p>
+                      <a:pPr algn="ctr" rtl="0" fontAlgn="ctr"/>
+                      <a:r>
+                        <a:rPr lang="en-US" sz="1400" u="none" strike="noStrike">
+                          <a:effectLst/>
+                        </a:rPr>
+                        <a:t>Random Forest (Non-Opt)</a:t>
+                      </a:r>
+                      <a:endParaRPr lang="en-US" sz="1400" b="1" i="0" u="none" strike="noStrike">
+                        <a:solidFill>
+                          <a:srgbClr val="000000"/>
+                        </a:solidFill>
+                        <a:effectLst/>
+                        <a:latin typeface="Calibri" panose="020F0502020204030204" pitchFamily="34" charset="0"/>
+                      </a:endParaRPr>
+                    </a:p>
+                  </a:txBody>
+                  <a:tcPr marL="9525" marR="9525" marT="9525" marB="0" anchor="ctr"/>
+                </a:tc>
+                <a:tc>
+                  <a:txBody>
+                    <a:bodyPr/>
+                    <a:lstStyle/>
+                    <a:p>
+                      <a:pPr algn="ctr" rtl="0" fontAlgn="ctr"/>
+                      <a:r>
+                        <a:rPr lang="en-US" sz="1600" u="none" strike="noStrike">
+                          <a:effectLst/>
+                        </a:rPr>
+                        <a:t>0.513</a:t>
+                      </a:r>
+                      <a:endParaRPr lang="en-US" sz="1600" b="0" i="0" u="none" strike="noStrike">
+                        <a:solidFill>
+                          <a:srgbClr val="000000"/>
+                        </a:solidFill>
+                        <a:effectLst/>
+                        <a:latin typeface="Calibri" panose="020F0502020204030204" pitchFamily="34" charset="0"/>
+                      </a:endParaRPr>
+                    </a:p>
+                  </a:txBody>
+                  <a:tcPr marL="9525" marR="9525" marT="9525" marB="0" anchor="ctr"/>
+                </a:tc>
+                <a:tc>
+                  <a:txBody>
+                    <a:bodyPr/>
+                    <a:lstStyle/>
+                    <a:p>
+                      <a:pPr algn="ctr" rtl="0" fontAlgn="ctr"/>
+                      <a:r>
+                        <a:rPr lang="en-US" sz="1600" u="none" strike="noStrike">
+                          <a:effectLst/>
+                        </a:rPr>
+                        <a:t>0.526</a:t>
+                      </a:r>
+                      <a:endParaRPr lang="en-US" sz="1600" b="0" i="0" u="none" strike="noStrike">
+                        <a:solidFill>
+                          <a:srgbClr val="000000"/>
+                        </a:solidFill>
+                        <a:effectLst/>
+                        <a:latin typeface="Calibri" panose="020F0502020204030204" pitchFamily="34" charset="0"/>
+                      </a:endParaRPr>
+                    </a:p>
+                  </a:txBody>
+                  <a:tcPr marL="9525" marR="9525" marT="9525" marB="0" anchor="ctr"/>
+                </a:tc>
+                <a:tc>
+                  <a:txBody>
+                    <a:bodyPr/>
+                    <a:lstStyle/>
+                    <a:p>
+                      <a:pPr algn="ctr" rtl="0" fontAlgn="ctr"/>
+                      <a:r>
+                        <a:rPr lang="en-US" sz="1600" u="none" strike="noStrike">
+                          <a:effectLst/>
+                        </a:rPr>
+                        <a:t>0.764</a:t>
+                      </a:r>
+                      <a:endParaRPr lang="en-US" sz="1600" b="0" i="0" u="none" strike="noStrike">
+                        <a:solidFill>
+                          <a:srgbClr val="000000"/>
+                        </a:solidFill>
+                        <a:effectLst/>
+                        <a:latin typeface="Calibri" panose="020F0502020204030204" pitchFamily="34" charset="0"/>
+                      </a:endParaRPr>
+                    </a:p>
+                  </a:txBody>
+                  <a:tcPr marL="9525" marR="9525" marT="9525" marB="0" anchor="ctr"/>
+                </a:tc>
+                <a:extLst>
+                  <a:ext uri="{0D108BD9-81ED-4DB2-BD59-A6C34878D82A}">
+                    <a16:rowId xmlns:a16="http://schemas.microsoft.com/office/drawing/2014/main" val="525683950"/>
+                  </a:ext>
+                </a:extLst>
+              </a:tr>
+              <a:tr h="454665">
+                <a:tc>
+                  <a:txBody>
+                    <a:bodyPr/>
+                    <a:lstStyle/>
+                    <a:p>
+                      <a:pPr algn="ctr" rtl="0" fontAlgn="ctr"/>
+                      <a:r>
+                        <a:rPr lang="en-US" sz="1400" u="none" strike="noStrike">
+                          <a:effectLst/>
+                        </a:rPr>
+                        <a:t>NN </a:t>
+                      </a:r>
+                      <a:endParaRPr lang="en-US" sz="1400" b="1" i="0" u="none" strike="noStrike">
+                        <a:solidFill>
+                          <a:srgbClr val="000000"/>
+                        </a:solidFill>
+                        <a:effectLst/>
+                        <a:latin typeface="Calibri" panose="020F0502020204030204" pitchFamily="34" charset="0"/>
+                      </a:endParaRPr>
+                    </a:p>
+                  </a:txBody>
+                  <a:tcPr marL="9525" marR="9525" marT="9525" marB="0" anchor="ctr"/>
+                </a:tc>
+                <a:tc>
+                  <a:txBody>
+                    <a:bodyPr/>
+                    <a:lstStyle/>
+                    <a:p>
+                      <a:pPr algn="ctr" rtl="0" fontAlgn="ctr"/>
+                      <a:r>
+                        <a:rPr lang="en-US" sz="1600" u="none" strike="noStrike">
+                          <a:effectLst/>
+                        </a:rPr>
+                        <a:t>0.516</a:t>
+                      </a:r>
+                      <a:endParaRPr lang="en-US" sz="1600" b="0" i="0" u="none" strike="noStrike">
+                        <a:solidFill>
+                          <a:srgbClr val="000000"/>
+                        </a:solidFill>
+                        <a:effectLst/>
+                        <a:latin typeface="Calibri" panose="020F0502020204030204" pitchFamily="34" charset="0"/>
+                      </a:endParaRPr>
+                    </a:p>
+                  </a:txBody>
+                  <a:tcPr marL="9525" marR="9525" marT="9525" marB="0" anchor="ctr"/>
+                </a:tc>
+                <a:tc>
+                  <a:txBody>
+                    <a:bodyPr/>
+                    <a:lstStyle/>
+                    <a:p>
+                      <a:pPr algn="ctr" rtl="0" fontAlgn="ctr"/>
+                      <a:r>
+                        <a:rPr lang="en-US" sz="1600" u="none" strike="noStrike">
+                          <a:effectLst/>
+                        </a:rPr>
+                        <a:t>0.53</a:t>
+                      </a:r>
+                      <a:endParaRPr lang="en-US" sz="1600" b="0" i="0" u="none" strike="noStrike">
+                        <a:solidFill>
+                          <a:srgbClr val="000000"/>
+                        </a:solidFill>
+                        <a:effectLst/>
+                        <a:latin typeface="Calibri" panose="020F0502020204030204" pitchFamily="34" charset="0"/>
+                      </a:endParaRPr>
+                    </a:p>
+                  </a:txBody>
+                  <a:tcPr marL="9525" marR="9525" marT="9525" marB="0" anchor="ctr"/>
+                </a:tc>
+                <a:tc>
+                  <a:txBody>
+                    <a:bodyPr/>
+                    <a:lstStyle/>
+                    <a:p>
+                      <a:pPr algn="ctr" rtl="0" fontAlgn="ctr"/>
+                      <a:r>
+                        <a:rPr lang="en-US" sz="1600" u="none" strike="noStrike" dirty="0">
+                          <a:effectLst/>
+                        </a:rPr>
+                        <a:t>0.674</a:t>
+                      </a:r>
+                      <a:endParaRPr lang="en-US" sz="1600" b="0" i="0" u="none" strike="noStrike" dirty="0">
+                        <a:solidFill>
+                          <a:srgbClr val="000000"/>
+                        </a:solidFill>
+                        <a:effectLst/>
+                        <a:latin typeface="Calibri" panose="020F0502020204030204" pitchFamily="34" charset="0"/>
+                      </a:endParaRPr>
+                    </a:p>
+                  </a:txBody>
+                  <a:tcPr marL="9525" marR="9525" marT="9525" marB="0" anchor="ctr"/>
+                </a:tc>
+                <a:extLst>
+                  <a:ext uri="{0D108BD9-81ED-4DB2-BD59-A6C34878D82A}">
+                    <a16:rowId xmlns:a16="http://schemas.microsoft.com/office/drawing/2014/main" val="215605737"/>
+                  </a:ext>
+                </a:extLst>
+              </a:tr>
+            </a:tbl>
+          </a:graphicData>
+        </a:graphic>
+      </p:graphicFrame>
     </p:spTree>
     <p:extLst>
       <p:ext uri="{BB962C8B-B14F-4D97-AF65-F5344CB8AC3E}">
@@ -7020,12 +7455,8 @@
           </a:p>
           <a:p>
             <a:r>
-              <a:rPr lang="en-US"/>
-              <a:t>Volumes </a:t>
-            </a:r>
-            <a:r>
               <a:rPr lang="en-US" dirty="0"/>
-              <a:t>for the last 4 days (std)</a:t>
+              <a:t>Volumes for the last 4 days (std)</a:t>
             </a:r>
           </a:p>
           <a:p>

</xml_diff>